<commit_message>
small fixes to lecture #16
</commit_message>
<xml_diff>
--- a/classes/stats2015/Lecture16.pptx
+++ b/classes/stats2015/Lecture16.pptx
@@ -232,7 +232,7 @@
             <a:fld id="{8FEEEB49-71AD-4F7F-9E1F-7D222FAD2947}" type="datetimeFigureOut">
               <a:rPr lang="en-US" smtClean="0"/>
               <a:pPr/>
-              <a:t>3/31/2015</a:t>
+              <a:t>4/1/2015</a:t>
             </a:fld>
             <a:endParaRPr lang="en-US"/>
           </a:p>
@@ -1418,7 +1418,7 @@
             <a:fld id="{1D8BD707-D9CF-40AE-B4C6-C98DA3205C09}" type="datetimeFigureOut">
               <a:rPr lang="en-US" smtClean="0"/>
               <a:pPr/>
-              <a:t>3/31/2015</a:t>
+              <a:t>4/1/2015</a:t>
             </a:fld>
             <a:endParaRPr lang="en-US"/>
           </a:p>
@@ -1585,7 +1585,7 @@
             <a:fld id="{1D8BD707-D9CF-40AE-B4C6-C98DA3205C09}" type="datetimeFigureOut">
               <a:rPr lang="en-US" smtClean="0"/>
               <a:pPr/>
-              <a:t>3/31/2015</a:t>
+              <a:t>4/1/2015</a:t>
             </a:fld>
             <a:endParaRPr lang="en-US"/>
           </a:p>
@@ -1762,7 +1762,7 @@
             <a:fld id="{1D8BD707-D9CF-40AE-B4C6-C98DA3205C09}" type="datetimeFigureOut">
               <a:rPr lang="en-US" smtClean="0"/>
               <a:pPr/>
-              <a:t>3/31/2015</a:t>
+              <a:t>4/1/2015</a:t>
             </a:fld>
             <a:endParaRPr lang="en-US"/>
           </a:p>
@@ -1929,7 +1929,7 @@
             <a:fld id="{1D8BD707-D9CF-40AE-B4C6-C98DA3205C09}" type="datetimeFigureOut">
               <a:rPr lang="en-US" smtClean="0"/>
               <a:pPr/>
-              <a:t>3/31/2015</a:t>
+              <a:t>4/1/2015</a:t>
             </a:fld>
             <a:endParaRPr lang="en-US"/>
           </a:p>
@@ -2172,7 +2172,7 @@
             <a:fld id="{1D8BD707-D9CF-40AE-B4C6-C98DA3205C09}" type="datetimeFigureOut">
               <a:rPr lang="en-US" smtClean="0"/>
               <a:pPr/>
-              <a:t>3/31/2015</a:t>
+              <a:t>4/1/2015</a:t>
             </a:fld>
             <a:endParaRPr lang="en-US"/>
           </a:p>
@@ -2457,7 +2457,7 @@
             <a:fld id="{1D8BD707-D9CF-40AE-B4C6-C98DA3205C09}" type="datetimeFigureOut">
               <a:rPr lang="en-US" smtClean="0"/>
               <a:pPr/>
-              <a:t>3/31/2015</a:t>
+              <a:t>4/1/2015</a:t>
             </a:fld>
             <a:endParaRPr lang="en-US"/>
           </a:p>
@@ -2876,7 +2876,7 @@
             <a:fld id="{1D8BD707-D9CF-40AE-B4C6-C98DA3205C09}" type="datetimeFigureOut">
               <a:rPr lang="en-US" smtClean="0"/>
               <a:pPr/>
-              <a:t>3/31/2015</a:t>
+              <a:t>4/1/2015</a:t>
             </a:fld>
             <a:endParaRPr lang="en-US"/>
           </a:p>
@@ -2991,7 +2991,7 @@
             <a:fld id="{1D8BD707-D9CF-40AE-B4C6-C98DA3205C09}" type="datetimeFigureOut">
               <a:rPr lang="en-US" smtClean="0"/>
               <a:pPr/>
-              <a:t>3/31/2015</a:t>
+              <a:t>4/1/2015</a:t>
             </a:fld>
             <a:endParaRPr lang="en-US"/>
           </a:p>
@@ -3083,7 +3083,7 @@
             <a:fld id="{1D8BD707-D9CF-40AE-B4C6-C98DA3205C09}" type="datetimeFigureOut">
               <a:rPr lang="en-US" smtClean="0"/>
               <a:pPr/>
-              <a:t>3/31/2015</a:t>
+              <a:t>4/1/2015</a:t>
             </a:fld>
             <a:endParaRPr lang="en-US"/>
           </a:p>
@@ -3357,7 +3357,7 @@
             <a:fld id="{1D8BD707-D9CF-40AE-B4C6-C98DA3205C09}" type="datetimeFigureOut">
               <a:rPr lang="en-US" smtClean="0"/>
               <a:pPr/>
-              <a:t>3/31/2015</a:t>
+              <a:t>4/1/2015</a:t>
             </a:fld>
             <a:endParaRPr lang="en-US"/>
           </a:p>
@@ -3607,7 +3607,7 @@
             <a:fld id="{1D8BD707-D9CF-40AE-B4C6-C98DA3205C09}" type="datetimeFigureOut">
               <a:rPr lang="en-US" smtClean="0"/>
               <a:pPr/>
-              <a:t>3/31/2015</a:t>
+              <a:t>4/1/2015</a:t>
             </a:fld>
             <a:endParaRPr lang="en-US"/>
           </a:p>
@@ -3817,7 +3817,7 @@
             <a:fld id="{1D8BD707-D9CF-40AE-B4C6-C98DA3205C09}" type="datetimeFigureOut">
               <a:rPr lang="en-US" smtClean="0"/>
               <a:pPr/>
-              <a:t>3/31/2015</a:t>
+              <a:t>4/1/2015</a:t>
             </a:fld>
             <a:endParaRPr lang="en-US"/>
           </a:p>
@@ -11208,7 +11208,11 @@
           <a:p>
             <a:r>
               <a:rPr lang="en-US" dirty="0" smtClean="0"/>
-              <a:t>Full model (one slope; one intercept)</a:t>
+              <a:t>Reduced </a:t>
+            </a:r>
+            <a:r>
+              <a:rPr lang="en-US" dirty="0" smtClean="0"/>
+              <a:t>model (one slope; one intercept)</a:t>
             </a:r>
             <a:endParaRPr lang="en-US" dirty="0"/>
           </a:p>
@@ -12166,7 +12170,7 @@
         <p:spPr>
           <a:xfrm>
             <a:off x="228600" y="533400"/>
-            <a:ext cx="8833124" cy="369332"/>
+            <a:ext cx="8459624" cy="369332"/>
           </a:xfrm>
           <a:prstGeom prst="rect">
             <a:avLst/>
@@ -12189,7 +12193,19 @@
             </a:r>
             <a:r>
               <a:rPr lang="en-US" dirty="0" smtClean="0"/>
-              <a:t>, we fail to reject a hypothesis that the residuals are not normally distributed</a:t>
+              <a:t>, we fail to reject a hypothesis that the residuals </a:t>
+            </a:r>
+            <a:r>
+              <a:rPr lang="en-US" smtClean="0"/>
+              <a:t>are </a:t>
+            </a:r>
+            <a:r>
+              <a:rPr lang="en-US" smtClean="0"/>
+              <a:t>normally </a:t>
+            </a:r>
+            <a:r>
+              <a:rPr lang="en-US" dirty="0" smtClean="0"/>
+              <a:t>distributed</a:t>
             </a:r>
             <a:endParaRPr lang="en-US" dirty="0"/>
           </a:p>

</xml_diff>